<commit_message>
Cleaned up life history data, working on glm models
Got some help from Maria, should do binom with adrate
</commit_message>
<xml_diff>
--- a/Gomez analysis plan/2017_10_16 Brazil Field An darlingi results.pptx
+++ b/Gomez analysis plan/2017_10_16 Brazil Field An darlingi results.pptx
@@ -218,7 +218,7 @@
           <a:p>
             <a:fld id="{5DC03B30-E841-400A-9808-DB43D522D272}" type="datetimeFigureOut">
               <a:rPr lang="en-US" smtClean="0"/>
-              <a:t>10/16/2017</a:t>
+              <a:t>10/17/2017</a:t>
             </a:fld>
             <a:endParaRPr lang="en-US"/>
           </a:p>
@@ -1072,7 +1072,7 @@
           <a:p>
             <a:fld id="{F18E78B6-7540-4731-9669-9F3D2A4C60D5}" type="datetimeFigureOut">
               <a:rPr lang="en-US" smtClean="0"/>
-              <a:t>10/16/2017</a:t>
+              <a:t>10/17/2017</a:t>
             </a:fld>
             <a:endParaRPr lang="en-US"/>
           </a:p>
@@ -1270,7 +1270,7 @@
           <a:p>
             <a:fld id="{F18E78B6-7540-4731-9669-9F3D2A4C60D5}" type="datetimeFigureOut">
               <a:rPr lang="en-US" smtClean="0"/>
-              <a:t>10/16/2017</a:t>
+              <a:t>10/17/2017</a:t>
             </a:fld>
             <a:endParaRPr lang="en-US"/>
           </a:p>
@@ -1478,7 +1478,7 @@
           <a:p>
             <a:fld id="{F18E78B6-7540-4731-9669-9F3D2A4C60D5}" type="datetimeFigureOut">
               <a:rPr lang="en-US" smtClean="0"/>
-              <a:t>10/16/2017</a:t>
+              <a:t>10/17/2017</a:t>
             </a:fld>
             <a:endParaRPr lang="en-US"/>
           </a:p>
@@ -1676,7 +1676,7 @@
           <a:p>
             <a:fld id="{F18E78B6-7540-4731-9669-9F3D2A4C60D5}" type="datetimeFigureOut">
               <a:rPr lang="en-US" smtClean="0"/>
-              <a:t>10/16/2017</a:t>
+              <a:t>10/17/2017</a:t>
             </a:fld>
             <a:endParaRPr lang="en-US"/>
           </a:p>
@@ -1951,7 +1951,7 @@
           <a:p>
             <a:fld id="{F18E78B6-7540-4731-9669-9F3D2A4C60D5}" type="datetimeFigureOut">
               <a:rPr lang="en-US" smtClean="0"/>
-              <a:t>10/16/2017</a:t>
+              <a:t>10/17/2017</a:t>
             </a:fld>
             <a:endParaRPr lang="en-US"/>
           </a:p>
@@ -2216,7 +2216,7 @@
           <a:p>
             <a:fld id="{F18E78B6-7540-4731-9669-9F3D2A4C60D5}" type="datetimeFigureOut">
               <a:rPr lang="en-US" smtClean="0"/>
-              <a:t>10/16/2017</a:t>
+              <a:t>10/17/2017</a:t>
             </a:fld>
             <a:endParaRPr lang="en-US"/>
           </a:p>
@@ -2628,7 +2628,7 @@
           <a:p>
             <a:fld id="{F18E78B6-7540-4731-9669-9F3D2A4C60D5}" type="datetimeFigureOut">
               <a:rPr lang="en-US" smtClean="0"/>
-              <a:t>10/16/2017</a:t>
+              <a:t>10/17/2017</a:t>
             </a:fld>
             <a:endParaRPr lang="en-US"/>
           </a:p>
@@ -2769,7 +2769,7 @@
           <a:p>
             <a:fld id="{F18E78B6-7540-4731-9669-9F3D2A4C60D5}" type="datetimeFigureOut">
               <a:rPr lang="en-US" smtClean="0"/>
-              <a:t>10/16/2017</a:t>
+              <a:t>10/17/2017</a:t>
             </a:fld>
             <a:endParaRPr lang="en-US"/>
           </a:p>
@@ -2882,7 +2882,7 @@
           <a:p>
             <a:fld id="{F18E78B6-7540-4731-9669-9F3D2A4C60D5}" type="datetimeFigureOut">
               <a:rPr lang="en-US" smtClean="0"/>
-              <a:t>10/16/2017</a:t>
+              <a:t>10/17/2017</a:t>
             </a:fld>
             <a:endParaRPr lang="en-US"/>
           </a:p>
@@ -3193,7 +3193,7 @@
           <a:p>
             <a:fld id="{F18E78B6-7540-4731-9669-9F3D2A4C60D5}" type="datetimeFigureOut">
               <a:rPr lang="en-US" smtClean="0"/>
-              <a:t>10/16/2017</a:t>
+              <a:t>10/17/2017</a:t>
             </a:fld>
             <a:endParaRPr lang="en-US"/>
           </a:p>
@@ -3481,7 +3481,7 @@
           <a:p>
             <a:fld id="{F18E78B6-7540-4731-9669-9F3D2A4C60D5}" type="datetimeFigureOut">
               <a:rPr lang="en-US" smtClean="0"/>
-              <a:t>10/16/2017</a:t>
+              <a:t>10/17/2017</a:t>
             </a:fld>
             <a:endParaRPr lang="en-US"/>
           </a:p>
@@ -3722,7 +3722,7 @@
           <a:p>
             <a:fld id="{F18E78B6-7540-4731-9669-9F3D2A4C60D5}" type="datetimeFigureOut">
               <a:rPr lang="en-US" smtClean="0"/>
-              <a:t>10/16/2017</a:t>
+              <a:t>10/17/2017</a:t>
             </a:fld>
             <a:endParaRPr lang="en-US"/>
           </a:p>
@@ -14633,10 +14633,10 @@
       </p:sp>
       <p:pic>
         <p:nvPicPr>
-          <p:cNvPr id="9" name="Content Placeholder 8">
+          <p:cNvPr id="6" name="Content Placeholder 5">
             <a:extLst>
               <a:ext uri="{FF2B5EF4-FFF2-40B4-BE49-F238E27FC236}">
-                <a16:creationId xmlns:a16="http://schemas.microsoft.com/office/drawing/2014/main" id="{DBA53038-6CC9-4CA3-9903-BEFF19BF2696}"/>
+                <a16:creationId xmlns:a16="http://schemas.microsoft.com/office/drawing/2014/main" id="{AF7CB404-7310-4432-9217-CCD83696EAD4}"/>
               </a:ext>
             </a:extLst>
           </p:cNvPr>
@@ -14661,8 +14661,8 @@
         </p:blipFill>
         <p:spPr>
           <a:xfrm>
-            <a:off x="2882198" y="1802765"/>
-            <a:ext cx="6153283" cy="4351338"/>
+            <a:off x="3551755" y="1825625"/>
+            <a:ext cx="5088489" cy="4351338"/>
           </a:xfrm>
         </p:spPr>
       </p:pic>

</xml_diff>